<commit_message>
Update Team 3 – Final Project Presentation.pptx
</commit_message>
<xml_diff>
--- a/Team 3 – Final Project Presentation.pptx
+++ b/Team 3 – Final Project Presentation.pptx
@@ -6,15 +6,17 @@
     <p:sldMasterId id="2147483672" r:id="rId2"/>
   </p:sldMasterIdLst>
   <p:notesMasterIdLst>
-    <p:notesMasterId r:id="rId9"/>
+    <p:notesMasterId r:id="rId11"/>
   </p:notesMasterIdLst>
   <p:sldIdLst>
     <p:sldId id="256" r:id="rId3"/>
-    <p:sldId id="257" r:id="rId4"/>
-    <p:sldId id="258" r:id="rId5"/>
-    <p:sldId id="261" r:id="rId6"/>
-    <p:sldId id="259" r:id="rId7"/>
-    <p:sldId id="260" r:id="rId8"/>
+    <p:sldId id="261" r:id="rId4"/>
+    <p:sldId id="262" r:id="rId5"/>
+    <p:sldId id="258" r:id="rId6"/>
+    <p:sldId id="260" r:id="rId7"/>
+    <p:sldId id="263" r:id="rId8"/>
+    <p:sldId id="264" r:id="rId9"/>
+    <p:sldId id="259" r:id="rId10"/>
   </p:sldIdLst>
   <p:sldSz cx="9144000" cy="5143500" type="screen16x9"/>
   <p:notesSz cx="6858000" cy="9144000"/>
@@ -816,7 +818,7 @@
   <p:cSld>
     <p:spTree>
       <p:nvGrpSpPr>
-        <p:cNvPr id="1" name="Shape 126"/>
+        <p:cNvPr id="1" name="Shape 132"/>
         <p:cNvGrpSpPr/>
         <p:nvPr/>
       </p:nvGrpSpPr>
@@ -830,7 +832,7 @@
       </p:grpSpPr>
       <p:sp>
         <p:nvSpPr>
-          <p:cNvPr id="127" name="Google Shape;127;g1adff10c7b5_2_76:notes"/>
+          <p:cNvPr id="133" name="Google Shape;133;g1adff10c7b5_2_81:notes"/>
           <p:cNvSpPr txBox="1">
             <a:spLocks noGrp="1"/>
           </p:cNvSpPr>
@@ -868,7 +870,7 @@
       </p:sp>
       <p:sp>
         <p:nvSpPr>
-          <p:cNvPr id="128" name="Google Shape;128;g1adff10c7b5_2_76:notes"/>
+          <p:cNvPr id="134" name="Google Shape;134;g1adff10c7b5_2_81:notes"/>
           <p:cNvSpPr>
             <a:spLocks noGrp="1" noRot="1" noChangeAspect="1"/>
           </p:cNvSpPr>
@@ -920,7 +922,7 @@
   <p:cSld>
     <p:spTree>
       <p:nvGrpSpPr>
-        <p:cNvPr id="1" name="Shape 132"/>
+        <p:cNvPr id="1" name="Shape 143"/>
         <p:cNvGrpSpPr/>
         <p:nvPr/>
       </p:nvGrpSpPr>
@@ -934,7 +936,7 @@
       </p:grpSpPr>
       <p:sp>
         <p:nvSpPr>
-          <p:cNvPr id="133" name="Google Shape;133;g1adff10c7b5_2_81:notes"/>
+          <p:cNvPr id="144" name="Google Shape;144;g1adff10c7b5_2_90:notes"/>
           <p:cNvSpPr txBox="1">
             <a:spLocks noGrp="1"/>
           </p:cNvSpPr>
@@ -972,7 +974,7 @@
       </p:sp>
       <p:sp>
         <p:nvSpPr>
-          <p:cNvPr id="134" name="Google Shape;134;g1adff10c7b5_2_81:notes"/>
+          <p:cNvPr id="145" name="Google Shape;145;g1adff10c7b5_2_90:notes"/>
           <p:cNvSpPr>
             <a:spLocks noGrp="1" noRot="1" noChangeAspect="1"/>
           </p:cNvSpPr>
@@ -982,8 +984,8 @@
         </p:nvSpPr>
         <p:spPr>
           <a:xfrm>
-            <a:off x="1143225" y="685800"/>
-            <a:ext cx="4572225" cy="3429000"/>
+            <a:off x="381000" y="685800"/>
+            <a:ext cx="6096000" cy="3429000"/>
           </a:xfrm>
           <a:custGeom>
             <a:avLst/>
@@ -1077,110 +1079,6 @@
       <p:sp>
         <p:nvSpPr>
           <p:cNvPr id="140" name="Google Shape;140;g1adff10c7b5_2_86:notes"/>
-          <p:cNvSpPr>
-            <a:spLocks noGrp="1" noRot="1" noChangeAspect="1"/>
-          </p:cNvSpPr>
-          <p:nvPr>
-            <p:ph type="sldImg" idx="2"/>
-          </p:nvPr>
-        </p:nvSpPr>
-        <p:spPr>
-          <a:xfrm>
-            <a:off x="1143225" y="685800"/>
-            <a:ext cx="4572225" cy="3429000"/>
-          </a:xfrm>
-          <a:custGeom>
-            <a:avLst/>
-            <a:gdLst/>
-            <a:ahLst/>
-            <a:cxnLst/>
-            <a:rect l="l" t="t" r="r" b="b"/>
-            <a:pathLst>
-              <a:path w="120000" h="120000" extrusionOk="0">
-                <a:moveTo>
-                  <a:pt x="0" y="0"/>
-                </a:moveTo>
-                <a:lnTo>
-                  <a:pt x="120000" y="0"/>
-                </a:lnTo>
-                <a:lnTo>
-                  <a:pt x="120000" y="120000"/>
-                </a:lnTo>
-                <a:lnTo>
-                  <a:pt x="0" y="120000"/>
-                </a:lnTo>
-                <a:close/>
-              </a:path>
-            </a:pathLst>
-          </a:custGeom>
-        </p:spPr>
-      </p:sp>
-    </p:spTree>
-  </p:cSld>
-  <p:clrMapOvr>
-    <a:masterClrMapping/>
-  </p:clrMapOvr>
-</p:notes>
-</file>
-
-<file path=ppt/notesSlides/notesSlide5.xml><?xml version="1.0" encoding="utf-8"?>
-<p:notes xmlns:a="http://schemas.openxmlformats.org/drawingml/2006/main" xmlns:r="http://schemas.openxmlformats.org/officeDocument/2006/relationships" xmlns:p="http://schemas.openxmlformats.org/presentationml/2006/main" showMasterSp="0" showMasterPhAnim="0">
-  <p:cSld>
-    <p:spTree>
-      <p:nvGrpSpPr>
-        <p:cNvPr id="1" name="Shape 143"/>
-        <p:cNvGrpSpPr/>
-        <p:nvPr/>
-      </p:nvGrpSpPr>
-      <p:grpSpPr>
-        <a:xfrm>
-          <a:off x="0" y="0"/>
-          <a:ext cx="0" cy="0"/>
-          <a:chOff x="0" y="0"/>
-          <a:chExt cx="0" cy="0"/>
-        </a:xfrm>
-      </p:grpSpPr>
-      <p:sp>
-        <p:nvSpPr>
-          <p:cNvPr id="144" name="Google Shape;144;g1adff10c7b5_2_90:notes"/>
-          <p:cNvSpPr txBox="1">
-            <a:spLocks noGrp="1"/>
-          </p:cNvSpPr>
-          <p:nvPr>
-            <p:ph type="body" idx="1"/>
-          </p:nvPr>
-        </p:nvSpPr>
-        <p:spPr>
-          <a:xfrm>
-            <a:off x="685800" y="4343400"/>
-            <a:ext cx="5486400" cy="4114800"/>
-          </a:xfrm>
-          <a:prstGeom prst="rect">
-            <a:avLst/>
-          </a:prstGeom>
-        </p:spPr>
-        <p:txBody>
-          <a:bodyPr spcFirstLastPara="1" wrap="square" lIns="91425" tIns="91425" rIns="91425" bIns="91425" anchor="t" anchorCtr="0">
-            <a:noAutofit/>
-          </a:bodyPr>
-          <a:lstStyle/>
-          <a:p>
-            <a:pPr marL="0" lvl="0" indent="0" algn="l" rtl="0">
-              <a:spcBef>
-                <a:spcPts val="0"/>
-              </a:spcBef>
-              <a:spcAft>
-                <a:spcPts val="0"/>
-              </a:spcAft>
-              <a:buNone/>
-            </a:pPr>
-            <a:endParaRPr/>
-          </a:p>
-        </p:txBody>
-      </p:sp>
-      <p:sp>
-        <p:nvSpPr>
-          <p:cNvPr id="145" name="Google Shape;145;g1adff10c7b5_2_90:notes"/>
           <p:cNvSpPr>
             <a:spLocks noGrp="1" noRot="1" noChangeAspect="1"/>
           </p:cNvSpPr>
@@ -14371,7 +14269,7 @@
   <p:cSld>
     <p:spTree>
       <p:nvGrpSpPr>
-        <p:cNvPr id="1" name="Shape 129"/>
+        <p:cNvPr id="1" name=""/>
         <p:cNvGrpSpPr/>
         <p:nvPr/>
       </p:nvGrpSpPr>
@@ -14385,8 +14283,14 @@
       </p:grpSpPr>
       <p:sp>
         <p:nvSpPr>
-          <p:cNvPr id="130" name="Google Shape;130;p27"/>
-          <p:cNvSpPr txBox="1">
+          <p:cNvPr id="3" name="Title 2">
+            <a:extLst>
+              <a:ext uri="{FF2B5EF4-FFF2-40B4-BE49-F238E27FC236}">
+                <a16:creationId xmlns:a16="http://schemas.microsoft.com/office/drawing/2014/main" id="{78446DFD-A794-B09A-E54F-38EF3B5FFF07}"/>
+              </a:ext>
+            </a:extLst>
+          </p:cNvPr>
+          <p:cNvSpPr>
             <a:spLocks noGrp="1"/>
           </p:cNvSpPr>
           <p:nvPr>
@@ -14395,98 +14299,80 @@
         </p:nvSpPr>
         <p:spPr>
           <a:xfrm>
-            <a:off x="640753" y="377713"/>
-            <a:ext cx="7874597" cy="790687"/>
+            <a:off x="276448" y="644762"/>
+            <a:ext cx="8295610" cy="790687"/>
+          </a:xfrm>
+        </p:spPr>
+        <p:txBody>
+          <a:bodyPr>
+            <a:normAutofit fontScale="90000"/>
+          </a:bodyPr>
+          <a:lstStyle/>
+          <a:p>
+            <a:r>
+              <a:rPr lang="en-US" sz="2700" b="1" dirty="0"/>
+              <a:t>We all listen to music a lot, right? Why do you believe a song becomes popular?</a:t>
+            </a:r>
+            <a:br>
+              <a:rPr lang="en-US" sz="3200" b="1" dirty="0"/>
+            </a:br>
+            <a:endParaRPr lang="en-IN" dirty="0"/>
+          </a:p>
+        </p:txBody>
+      </p:sp>
+      <p:pic>
+        <p:nvPicPr>
+          <p:cNvPr id="4" name="Picture 2" descr="You could be better at thinking in daily life, here's how | Think">
+            <a:extLst>
+              <a:ext uri="{FF2B5EF4-FFF2-40B4-BE49-F238E27FC236}">
+                <a16:creationId xmlns:a16="http://schemas.microsoft.com/office/drawing/2014/main" id="{B987D58F-12CE-5666-6BCB-3478FBD982CC}"/>
+              </a:ext>
+            </a:extLst>
+          </p:cNvPr>
+          <p:cNvPicPr>
+            <a:picLocks noChangeAspect="1" noChangeArrowheads="1"/>
+          </p:cNvPicPr>
+          <p:nvPr/>
+        </p:nvPicPr>
+        <p:blipFill>
+          <a:blip r:embed="rId2">
+            <a:extLst>
+              <a:ext uri="{28A0092B-C50C-407E-A947-70E740481C1C}">
+                <a14:useLocalDpi xmlns:a14="http://schemas.microsoft.com/office/drawing/2010/main" val="0"/>
+              </a:ext>
+            </a:extLst>
+          </a:blip>
+          <a:srcRect/>
+          <a:stretch>
+            <a:fillRect/>
+          </a:stretch>
+        </p:blipFill>
+        <p:spPr bwMode="auto">
+          <a:xfrm>
+            <a:off x="2558902" y="1297172"/>
+            <a:ext cx="3444949" cy="2806222"/>
           </a:xfrm>
           <a:prstGeom prst="rect">
             <a:avLst/>
           </a:prstGeom>
           <a:noFill/>
-          <a:ln>
-            <a:noFill/>
-          </a:ln>
+          <a:extLst>
+            <a:ext uri="{909E8E84-426E-40DD-AFC4-6F175D3DCCD1}">
+              <a14:hiddenFill xmlns:a14="http://schemas.microsoft.com/office/drawing/2010/main">
+                <a:solidFill>
+                  <a:srgbClr val="FFFFFF"/>
+                </a:solidFill>
+              </a14:hiddenFill>
+            </a:ext>
+          </a:extLst>
         </p:spPr>
-        <p:txBody>
-          <a:bodyPr spcFirstLastPara="1" wrap="square" lIns="68575" tIns="34275" rIns="68575" bIns="34275" anchor="ctr" anchorCtr="0">
-            <a:normAutofit/>
-          </a:bodyPr>
-          <a:lstStyle/>
-          <a:p>
-            <a:pPr marL="0" lvl="0" indent="0" algn="l" rtl="0">
-              <a:lnSpc>
-                <a:spcPct val="90000"/>
-              </a:lnSpc>
-              <a:spcBef>
-                <a:spcPts val="0"/>
-              </a:spcBef>
-              <a:spcAft>
-                <a:spcPts val="0"/>
-              </a:spcAft>
-              <a:buClr>
-                <a:srgbClr val="3F3F3F"/>
-              </a:buClr>
-              <a:buSzPts val="3000"/>
-              <a:buFont typeface="Arial"/>
-              <a:buNone/>
-            </a:pPr>
-            <a:r>
-              <a:rPr lang="en"/>
-              <a:t>Problem Statement/ Objective</a:t>
-            </a:r>
-            <a:endParaRPr/>
-          </a:p>
-        </p:txBody>
-      </p:sp>
-      <p:sp>
-        <p:nvSpPr>
-          <p:cNvPr id="131" name="Google Shape;131;p27"/>
-          <p:cNvSpPr txBox="1">
-            <a:spLocks noGrp="1"/>
-          </p:cNvSpPr>
-          <p:nvPr>
-            <p:ph type="body" idx="1"/>
-          </p:nvPr>
-        </p:nvSpPr>
-        <p:spPr>
-          <a:xfrm>
-            <a:off x="628650" y="1369219"/>
-            <a:ext cx="7886700" cy="2605881"/>
-          </a:xfrm>
-          <a:prstGeom prst="rect">
-            <a:avLst/>
-          </a:prstGeom>
-          <a:noFill/>
-          <a:ln>
-            <a:noFill/>
-          </a:ln>
-        </p:spPr>
-        <p:txBody>
-          <a:bodyPr spcFirstLastPara="1" wrap="square" lIns="68575" tIns="34275" rIns="68575" bIns="34275" anchor="t" anchorCtr="0">
-            <a:normAutofit/>
-          </a:bodyPr>
-          <a:lstStyle/>
-          <a:p>
-            <a:pPr marL="0" lvl="0" indent="0" algn="l" rtl="0">
-              <a:lnSpc>
-                <a:spcPct val="90000"/>
-              </a:lnSpc>
-              <a:spcBef>
-                <a:spcPts val="0"/>
-              </a:spcBef>
-              <a:spcAft>
-                <a:spcPts val="0"/>
-              </a:spcAft>
-              <a:buClr>
-                <a:srgbClr val="595959"/>
-              </a:buClr>
-              <a:buSzPts val="2100"/>
-              <a:buNone/>
-            </a:pPr>
-            <a:endParaRPr/>
-          </a:p>
-        </p:txBody>
-      </p:sp>
+      </p:pic>
     </p:spTree>
+    <p:extLst>
+      <p:ext uri="{BB962C8B-B14F-4D97-AF65-F5344CB8AC3E}">
+        <p14:creationId xmlns:p14="http://schemas.microsoft.com/office/powerpoint/2010/main" val="3736557627"/>
+      </p:ext>
+    </p:extLst>
   </p:cSld>
   <p:clrMapOvr>
     <a:masterClrMapping/>
@@ -14495,6 +14381,135 @@
 </file>
 
 <file path=ppt/slides/slide3.xml><?xml version="1.0" encoding="utf-8"?>
+<p:sld xmlns:a="http://schemas.openxmlformats.org/drawingml/2006/main" xmlns:r="http://schemas.openxmlformats.org/officeDocument/2006/relationships" xmlns:p="http://schemas.openxmlformats.org/presentationml/2006/main">
+  <p:cSld>
+    <p:spTree>
+      <p:nvGrpSpPr>
+        <p:cNvPr id="1" name=""/>
+        <p:cNvGrpSpPr/>
+        <p:nvPr/>
+      </p:nvGrpSpPr>
+      <p:grpSpPr>
+        <a:xfrm>
+          <a:off x="0" y="0"/>
+          <a:ext cx="0" cy="0"/>
+          <a:chOff x="0" y="0"/>
+          <a:chExt cx="0" cy="0"/>
+        </a:xfrm>
+      </p:grpSpPr>
+      <p:sp>
+        <p:nvSpPr>
+          <p:cNvPr id="2" name="Title 1">
+            <a:extLst>
+              <a:ext uri="{FF2B5EF4-FFF2-40B4-BE49-F238E27FC236}">
+                <a16:creationId xmlns:a16="http://schemas.microsoft.com/office/drawing/2014/main" id="{3ED4BC00-C9A8-A95A-6657-53D103078CCD}"/>
+              </a:ext>
+            </a:extLst>
+          </p:cNvPr>
+          <p:cNvSpPr>
+            <a:spLocks noGrp="1"/>
+          </p:cNvSpPr>
+          <p:nvPr>
+            <p:ph type="title"/>
+          </p:nvPr>
+        </p:nvSpPr>
+        <p:spPr/>
+        <p:txBody>
+          <a:bodyPr>
+            <a:noAutofit/>
+          </a:bodyPr>
+          <a:lstStyle/>
+          <a:p>
+            <a:r>
+              <a:rPr lang="en-IN" sz="3000" b="1" dirty="0"/>
+              <a:t>Objective</a:t>
+            </a:r>
+          </a:p>
+        </p:txBody>
+      </p:sp>
+      <p:sp>
+        <p:nvSpPr>
+          <p:cNvPr id="3" name="Text Placeholder 2">
+            <a:extLst>
+              <a:ext uri="{FF2B5EF4-FFF2-40B4-BE49-F238E27FC236}">
+                <a16:creationId xmlns:a16="http://schemas.microsoft.com/office/drawing/2014/main" id="{8D55B3CB-02FE-9ECE-4B23-F6AE4A41C8D6}"/>
+              </a:ext>
+            </a:extLst>
+          </p:cNvPr>
+          <p:cNvSpPr>
+            <a:spLocks noGrp="1"/>
+          </p:cNvSpPr>
+          <p:nvPr>
+            <p:ph type="body" idx="1"/>
+          </p:nvPr>
+        </p:nvSpPr>
+        <p:spPr/>
+        <p:txBody>
+          <a:bodyPr/>
+          <a:lstStyle/>
+          <a:p>
+            <a:pPr>
+              <a:lnSpc>
+                <a:spcPct val="150000"/>
+              </a:lnSpc>
+            </a:pPr>
+            <a:r>
+              <a:rPr lang="en-US" sz="1800" dirty="0"/>
+              <a:t>Identifying music trends and characteristics over the past one hundred years. </a:t>
+            </a:r>
+          </a:p>
+          <a:p>
+            <a:pPr>
+              <a:lnSpc>
+                <a:spcPct val="150000"/>
+              </a:lnSpc>
+            </a:pPr>
+            <a:r>
+              <a:rPr lang="en-US" sz="1800" dirty="0"/>
+              <a:t>Spotify Data extracted from Kaggle</a:t>
+            </a:r>
+          </a:p>
+          <a:p>
+            <a:pPr>
+              <a:lnSpc>
+                <a:spcPct val="150000"/>
+              </a:lnSpc>
+            </a:pPr>
+            <a:r>
+              <a:rPr lang="en-US" sz="1800" dirty="0"/>
+              <a:t>Raw Data contained 114k+ tracks and 11 audio features</a:t>
+            </a:r>
+          </a:p>
+          <a:p>
+            <a:pPr>
+              <a:lnSpc>
+                <a:spcPct val="150000"/>
+              </a:lnSpc>
+            </a:pPr>
+            <a:r>
+              <a:rPr lang="en-US" sz="1800" dirty="0"/>
+              <a:t>Data contains information on release by year and provides numerical ratings for different characteristics of music released.</a:t>
+            </a:r>
+          </a:p>
+          <a:p>
+            <a:endParaRPr lang="en-IN" dirty="0"/>
+          </a:p>
+        </p:txBody>
+      </p:sp>
+    </p:spTree>
+    <p:extLst>
+      <p:ext uri="{BB962C8B-B14F-4D97-AF65-F5344CB8AC3E}">
+        <p14:creationId xmlns:p14="http://schemas.microsoft.com/office/powerpoint/2010/main" val="3559205285"/>
+      </p:ext>
+    </p:extLst>
+  </p:cSld>
+  <p:clrMapOvr>
+    <a:masterClrMapping/>
+  </p:clrMapOvr>
+</p:sld>
+</file>
+
+<file path=ppt/slides/slide4.xml><?xml version="1.0" encoding="utf-8"?>
 <p:sld xmlns:a="http://schemas.openxmlformats.org/drawingml/2006/main" xmlns:r="http://schemas.openxmlformats.org/officeDocument/2006/relationships" xmlns:p="http://schemas.openxmlformats.org/presentationml/2006/main">
   <p:cSld>
     <p:spTree>
@@ -14558,10 +14573,10 @@
               <a:buNone/>
             </a:pPr>
             <a:r>
-              <a:rPr lang="en"/>
+              <a:rPr lang="en" dirty="0"/>
               <a:t>SMART Questions?</a:t>
             </a:r>
-            <a:endParaRPr/>
+            <a:endParaRPr dirty="0"/>
           </a:p>
         </p:txBody>
       </p:sp>
@@ -14611,7 +14626,7 @@
               <a:buNone/>
             </a:pPr>
             <a:r>
-              <a:rPr lang="en" sz="1200" b="1" u="sng">
+              <a:rPr lang="en" sz="1200" b="1" u="sng" dirty="0">
                 <a:highlight>
                   <a:srgbClr val="FFFFFF"/>
                 </a:highlight>
@@ -14623,7 +14638,7 @@
               <a:t>S:</a:t>
             </a:r>
             <a:r>
-              <a:rPr lang="en" sz="1200">
+              <a:rPr lang="en" sz="1200" dirty="0">
                 <a:highlight>
                   <a:srgbClr val="FFFFFF"/>
                 </a:highlight>
@@ -14634,7 +14649,7 @@
               </a:rPr>
               <a:t> This question is tied to 3 specific columns in the dataset and a clear response variable, it is quite a specific question.</a:t>
             </a:r>
-            <a:endParaRPr sz="1200">
+            <a:endParaRPr sz="1200" dirty="0">
               <a:latin typeface="Arial"/>
               <a:ea typeface="Arial"/>
               <a:cs typeface="Arial"/>
@@ -14659,7 +14674,7 @@
               <a:buNone/>
             </a:pPr>
             <a:r>
-              <a:rPr lang="en" sz="1200" b="1" u="sng">
+              <a:rPr lang="en" sz="1200" b="1" u="sng" dirty="0">
                 <a:highlight>
                   <a:srgbClr val="FFFFFF"/>
                 </a:highlight>
@@ -14671,7 +14686,7 @@
               <a:t>M:</a:t>
             </a:r>
             <a:r>
-              <a:rPr lang="en" sz="1200">
+              <a:rPr lang="en" sz="1200" dirty="0">
                 <a:highlight>
                   <a:srgbClr val="FFFFFF"/>
                 </a:highlight>
@@ -14682,7 +14697,7 @@
               </a:rPr>
               <a:t> Our response variable is clearly numeric and shows how many times a song is streamed. It is easily measurable.</a:t>
             </a:r>
-            <a:endParaRPr sz="1200">
+            <a:endParaRPr sz="1200" dirty="0">
               <a:latin typeface="Arial"/>
               <a:ea typeface="Arial"/>
               <a:cs typeface="Arial"/>
@@ -14707,7 +14722,7 @@
               <a:buNone/>
             </a:pPr>
             <a:r>
-              <a:rPr lang="en" sz="1200" b="1" u="sng">
+              <a:rPr lang="en" sz="1200" b="1" u="sng" dirty="0">
                 <a:highlight>
                   <a:srgbClr val="FFFFFF"/>
                 </a:highlight>
@@ -14719,7 +14734,7 @@
               <a:t>A:</a:t>
             </a:r>
             <a:r>
-              <a:rPr lang="en" sz="1200">
+              <a:rPr lang="en" sz="1200" dirty="0">
                 <a:highlight>
                   <a:srgbClr val="FFFFFF"/>
                 </a:highlight>
@@ -14730,7 +14745,7 @@
               </a:rPr>
               <a:t> This question is quite attainable with relatively basic modelling and regression methods as all variables are pretty standard integer or categorical data.</a:t>
             </a:r>
-            <a:endParaRPr sz="1200">
+            <a:endParaRPr sz="1200" dirty="0">
               <a:latin typeface="Arial"/>
               <a:ea typeface="Arial"/>
               <a:cs typeface="Arial"/>
@@ -14755,7 +14770,7 @@
               <a:buNone/>
             </a:pPr>
             <a:r>
-              <a:rPr lang="en" sz="1200" b="1" u="sng">
+              <a:rPr lang="en" sz="1200" b="1" u="sng" dirty="0">
                 <a:highlight>
                   <a:srgbClr val="FFFFFF"/>
                 </a:highlight>
@@ -14767,7 +14782,7 @@
               <a:t>R:</a:t>
             </a:r>
             <a:r>
-              <a:rPr lang="en" sz="1200">
+              <a:rPr lang="en" sz="1200" dirty="0">
                 <a:highlight>
                   <a:srgbClr val="FFFFFF"/>
                 </a:highlight>
@@ -14778,7 +14793,7 @@
               </a:rPr>
               <a:t> This question will attempt to refine a popular song down to its core components from a music theory standpoint and give insight into creating one.</a:t>
             </a:r>
-            <a:endParaRPr sz="1200">
+            <a:endParaRPr sz="1200" dirty="0">
               <a:latin typeface="Arial"/>
               <a:ea typeface="Arial"/>
               <a:cs typeface="Arial"/>
@@ -14803,7 +14818,7 @@
               <a:buNone/>
             </a:pPr>
             <a:r>
-              <a:rPr lang="en" sz="1200" b="1" u="sng">
+              <a:rPr lang="en" sz="1200" b="1" u="sng" dirty="0">
                 <a:highlight>
                   <a:srgbClr val="FFFFFF"/>
                 </a:highlight>
@@ -14815,7 +14830,7 @@
               <a:t>T:</a:t>
             </a:r>
             <a:r>
-              <a:rPr lang="en" sz="1200">
+              <a:rPr lang="en" sz="1200" dirty="0">
                 <a:highlight>
                   <a:srgbClr val="FFFFFF"/>
                 </a:highlight>
@@ -14826,7 +14841,7 @@
               </a:rPr>
               <a:t> This project will be easily doable with a team of 4 as the dataset is quite clean from the start and the team is big enough to finish the project quickly</a:t>
             </a:r>
-            <a:endParaRPr sz="1200">
+            <a:endParaRPr sz="1200" dirty="0">
               <a:latin typeface="Arial"/>
               <a:ea typeface="Arial"/>
               <a:cs typeface="Arial"/>
@@ -14843,7 +14858,366 @@
 </p:sld>
 </file>
 
-<file path=ppt/slides/slide4.xml><?xml version="1.0" encoding="utf-8"?>
+<file path=ppt/slides/slide5.xml><?xml version="1.0" encoding="utf-8"?>
+<p:sld xmlns:a="http://schemas.openxmlformats.org/drawingml/2006/main" xmlns:r="http://schemas.openxmlformats.org/officeDocument/2006/relationships" xmlns:p="http://schemas.openxmlformats.org/presentationml/2006/main">
+  <p:cSld>
+    <p:spTree>
+      <p:nvGrpSpPr>
+        <p:cNvPr id="1" name="Shape 146"/>
+        <p:cNvGrpSpPr/>
+        <p:nvPr/>
+      </p:nvGrpSpPr>
+      <p:grpSpPr>
+        <a:xfrm>
+          <a:off x="0" y="0"/>
+          <a:ext cx="0" cy="0"/>
+          <a:chOff x="0" y="0"/>
+          <a:chExt cx="0" cy="0"/>
+        </a:xfrm>
+      </p:grpSpPr>
+      <p:sp>
+        <p:nvSpPr>
+          <p:cNvPr id="147" name="Google Shape;147;p30"/>
+          <p:cNvSpPr txBox="1">
+            <a:spLocks noGrp="1"/>
+          </p:cNvSpPr>
+          <p:nvPr>
+            <p:ph type="title"/>
+          </p:nvPr>
+        </p:nvSpPr>
+        <p:spPr>
+          <a:xfrm>
+            <a:off x="320040" y="98994"/>
+            <a:ext cx="7874597" cy="790687"/>
+          </a:xfrm>
+          <a:prstGeom prst="rect">
+            <a:avLst/>
+          </a:prstGeom>
+          <a:noFill/>
+          <a:ln>
+            <a:noFill/>
+          </a:ln>
+        </p:spPr>
+        <p:txBody>
+          <a:bodyPr spcFirstLastPara="1" wrap="square" lIns="68575" tIns="34275" rIns="68575" bIns="34275" anchor="ctr" anchorCtr="0">
+            <a:normAutofit/>
+          </a:bodyPr>
+          <a:lstStyle/>
+          <a:p>
+            <a:pPr marL="0" lvl="0" indent="0" algn="l" rtl="0">
+              <a:lnSpc>
+                <a:spcPct val="90000"/>
+              </a:lnSpc>
+              <a:spcBef>
+                <a:spcPts val="0"/>
+              </a:spcBef>
+              <a:spcAft>
+                <a:spcPts val="0"/>
+              </a:spcAft>
+              <a:buClr>
+                <a:srgbClr val="3F3F3F"/>
+              </a:buClr>
+              <a:buSzPts val="3000"/>
+              <a:buFont typeface="Arial"/>
+              <a:buNone/>
+            </a:pPr>
+            <a:r>
+              <a:rPr lang="en" dirty="0"/>
+              <a:t>Dataset Description</a:t>
+            </a:r>
+            <a:endParaRPr dirty="0"/>
+          </a:p>
+        </p:txBody>
+      </p:sp>
+      <p:sp>
+        <p:nvSpPr>
+          <p:cNvPr id="148" name="Google Shape;148;p30"/>
+          <p:cNvSpPr txBox="1">
+            <a:spLocks noGrp="1"/>
+          </p:cNvSpPr>
+          <p:nvPr>
+            <p:ph type="body" idx="1"/>
+          </p:nvPr>
+        </p:nvSpPr>
+        <p:spPr>
+          <a:xfrm>
+            <a:off x="320040" y="886227"/>
+            <a:ext cx="7886700" cy="2962759"/>
+          </a:xfrm>
+          <a:prstGeom prst="rect">
+            <a:avLst/>
+          </a:prstGeom>
+          <a:noFill/>
+          <a:ln>
+            <a:noFill/>
+          </a:ln>
+        </p:spPr>
+        <p:txBody>
+          <a:bodyPr spcFirstLastPara="1" wrap="square" lIns="68575" tIns="34275" rIns="68575" bIns="34275" anchor="t" anchorCtr="0">
+            <a:normAutofit fontScale="25000" lnSpcReduction="20000"/>
+          </a:bodyPr>
+          <a:lstStyle/>
+          <a:p>
+            <a:pPr marL="285750" lvl="0" indent="-285750" algn="l" rtl="0">
+              <a:lnSpc>
+                <a:spcPct val="150000"/>
+              </a:lnSpc>
+              <a:spcBef>
+                <a:spcPts val="0"/>
+              </a:spcBef>
+              <a:spcAft>
+                <a:spcPts val="0"/>
+              </a:spcAft>
+              <a:buClr>
+                <a:srgbClr val="595959"/>
+              </a:buClr>
+              <a:buSzPts val="2100"/>
+              <a:buFont typeface="Arial" panose="020B0604020202020204" pitchFamily="34" charset="0"/>
+              <a:buChar char="•"/>
+            </a:pPr>
+            <a:r>
+              <a:rPr lang="en" sz="4800" dirty="0"/>
+              <a:t>This is a spotify dataset, which has songs from over 1000 artists and covers about 125 different genres. This dataset was created using Spotify API.</a:t>
+            </a:r>
+          </a:p>
+          <a:p>
+            <a:pPr marL="285750" lvl="0" indent="-285750" algn="l" rtl="0">
+              <a:lnSpc>
+                <a:spcPct val="150000"/>
+              </a:lnSpc>
+              <a:spcBef>
+                <a:spcPts val="0"/>
+              </a:spcBef>
+              <a:spcAft>
+                <a:spcPts val="0"/>
+              </a:spcAft>
+              <a:buClr>
+                <a:srgbClr val="595959"/>
+              </a:buClr>
+              <a:buSzPts val="2100"/>
+              <a:buFont typeface="Arial" panose="020B0604020202020204" pitchFamily="34" charset="0"/>
+              <a:buChar char="•"/>
+            </a:pPr>
+            <a:r>
+              <a:rPr lang="en" sz="4800" dirty="0"/>
+              <a:t>114K observations and 21 columns.</a:t>
+            </a:r>
+          </a:p>
+          <a:p>
+            <a:pPr marL="285750" lvl="0" indent="-285750" algn="l" rtl="0">
+              <a:lnSpc>
+                <a:spcPct val="150000"/>
+              </a:lnSpc>
+              <a:spcBef>
+                <a:spcPts val="0"/>
+              </a:spcBef>
+              <a:spcAft>
+                <a:spcPts val="0"/>
+              </a:spcAft>
+              <a:buClr>
+                <a:srgbClr val="595959"/>
+              </a:buClr>
+              <a:buSzPts val="2100"/>
+              <a:buFont typeface="Arial" panose="020B0604020202020204" pitchFamily="34" charset="0"/>
+              <a:buChar char="•"/>
+            </a:pPr>
+            <a:r>
+              <a:rPr lang="en" sz="4800" dirty="0"/>
+              <a:t>The popularity column is of type ‘int’ and has a range 0 to 100.</a:t>
+            </a:r>
+          </a:p>
+          <a:p>
+            <a:pPr marL="285750" lvl="0" indent="-285750" algn="l" rtl="0">
+              <a:lnSpc>
+                <a:spcPct val="150000"/>
+              </a:lnSpc>
+              <a:spcBef>
+                <a:spcPts val="0"/>
+              </a:spcBef>
+              <a:spcAft>
+                <a:spcPts val="0"/>
+              </a:spcAft>
+              <a:buClr>
+                <a:srgbClr val="595959"/>
+              </a:buClr>
+              <a:buSzPts val="2100"/>
+              <a:buFont typeface="Arial" panose="020B0604020202020204" pitchFamily="34" charset="0"/>
+              <a:buChar char="•"/>
+            </a:pPr>
+            <a:r>
+              <a:rPr lang="en" sz="4800" dirty="0"/>
+              <a:t>Our dataset is clean and all variables are standard integer or categorical data.</a:t>
+            </a:r>
+          </a:p>
+          <a:p>
+            <a:pPr marL="285750" indent="-285750">
+              <a:lnSpc>
+                <a:spcPct val="150000"/>
+              </a:lnSpc>
+              <a:spcBef>
+                <a:spcPts val="0"/>
+              </a:spcBef>
+              <a:buFont typeface="Arial" panose="020B0604020202020204" pitchFamily="34" charset="0"/>
+              <a:buChar char="•"/>
+            </a:pPr>
+            <a:r>
+              <a:rPr lang="en-IN" sz="4800" dirty="0"/>
+              <a:t>Since there were no NA values, no observations were dropped.</a:t>
+            </a:r>
+          </a:p>
+          <a:p>
+            <a:pPr marL="285750" indent="-285750">
+              <a:lnSpc>
+                <a:spcPct val="150000"/>
+              </a:lnSpc>
+              <a:spcBef>
+                <a:spcPts val="0"/>
+              </a:spcBef>
+              <a:buFont typeface="Arial" panose="020B0604020202020204" pitchFamily="34" charset="0"/>
+              <a:buChar char="•"/>
+            </a:pPr>
+            <a:r>
+              <a:rPr lang="en-US" sz="4800" dirty="0"/>
+              <a:t>Loudness is measured in Db (-60 to 0db)</a:t>
+            </a:r>
+            <a:endParaRPr lang="en" sz="4800" dirty="0"/>
+          </a:p>
+          <a:p>
+            <a:pPr marL="285750" lvl="0" indent="-285750" algn="l" rtl="0">
+              <a:lnSpc>
+                <a:spcPct val="150000"/>
+              </a:lnSpc>
+              <a:spcBef>
+                <a:spcPts val="0"/>
+              </a:spcBef>
+              <a:spcAft>
+                <a:spcPts val="0"/>
+              </a:spcAft>
+              <a:buClr>
+                <a:srgbClr val="595959"/>
+              </a:buClr>
+              <a:buSzPts val="2100"/>
+              <a:buFont typeface="Arial" panose="020B0604020202020204" pitchFamily="34" charset="0"/>
+              <a:buChar char="•"/>
+            </a:pPr>
+            <a:r>
+              <a:rPr lang="en" sz="4800" dirty="0"/>
+              <a:t>Models used:</a:t>
+            </a:r>
+          </a:p>
+          <a:p>
+            <a:pPr marL="0" lvl="0" indent="0" algn="l" rtl="0">
+              <a:lnSpc>
+                <a:spcPct val="150000"/>
+              </a:lnSpc>
+              <a:spcBef>
+                <a:spcPts val="0"/>
+              </a:spcBef>
+              <a:spcAft>
+                <a:spcPts val="0"/>
+              </a:spcAft>
+              <a:buClr>
+                <a:srgbClr val="595959"/>
+              </a:buClr>
+              <a:buSzPts val="2100"/>
+            </a:pPr>
+            <a:r>
+              <a:rPr lang="en" sz="4800" dirty="0"/>
+              <a:t>      i) KNN</a:t>
+            </a:r>
+          </a:p>
+          <a:p>
+            <a:pPr marL="0" lvl="0" indent="0" algn="l" rtl="0">
+              <a:lnSpc>
+                <a:spcPct val="150000"/>
+              </a:lnSpc>
+              <a:spcBef>
+                <a:spcPts val="0"/>
+              </a:spcBef>
+              <a:spcAft>
+                <a:spcPts val="0"/>
+              </a:spcAft>
+              <a:buClr>
+                <a:srgbClr val="595959"/>
+              </a:buClr>
+              <a:buSzPts val="2100"/>
+            </a:pPr>
+            <a:r>
+              <a:rPr lang="en" sz="4800" dirty="0"/>
+              <a:t>      ii) XGBoost</a:t>
+            </a:r>
+          </a:p>
+          <a:p>
+            <a:pPr marL="0" indent="0">
+              <a:lnSpc>
+                <a:spcPct val="150000"/>
+              </a:lnSpc>
+              <a:spcBef>
+                <a:spcPts val="0"/>
+              </a:spcBef>
+            </a:pPr>
+            <a:r>
+              <a:rPr lang="en" sz="4800" dirty="0"/>
+              <a:t>      iii) </a:t>
+            </a:r>
+            <a:r>
+              <a:rPr lang="en-IN" sz="4800" dirty="0"/>
+              <a:t>Polynomial Regression</a:t>
+            </a:r>
+          </a:p>
+          <a:p>
+            <a:pPr marL="0" indent="0">
+              <a:lnSpc>
+                <a:spcPct val="150000"/>
+              </a:lnSpc>
+              <a:spcBef>
+                <a:spcPts val="0"/>
+              </a:spcBef>
+            </a:pPr>
+            <a:r>
+              <a:rPr lang="en-IN" sz="4800" dirty="0"/>
+              <a:t>      iv) Multi-Linear Regression</a:t>
+            </a:r>
+          </a:p>
+          <a:p>
+            <a:br>
+              <a:rPr lang="en-IN" sz="4000" dirty="0"/>
+            </a:br>
+            <a:endParaRPr lang="en" sz="4800" dirty="0"/>
+          </a:p>
+          <a:p>
+            <a:pPr marL="0" lvl="0" indent="0" algn="l" rtl="0">
+              <a:lnSpc>
+                <a:spcPct val="90000"/>
+              </a:lnSpc>
+              <a:spcBef>
+                <a:spcPts val="0"/>
+              </a:spcBef>
+              <a:spcAft>
+                <a:spcPts val="0"/>
+              </a:spcAft>
+              <a:buClr>
+                <a:srgbClr val="595959"/>
+              </a:buClr>
+              <a:buSzPts val="2100"/>
+            </a:pPr>
+            <a:r>
+              <a:rPr lang="en" sz="1600" dirty="0"/>
+              <a:t>     </a:t>
+            </a:r>
+            <a:endParaRPr sz="1600" dirty="0"/>
+          </a:p>
+        </p:txBody>
+      </p:sp>
+    </p:spTree>
+  </p:cSld>
+  <p:clrMapOvr>
+    <a:masterClrMapping/>
+  </p:clrMapOvr>
+</p:sld>
+</file>
+
+<file path=ppt/slides/slide6.xml><?xml version="1.0" encoding="utf-8"?>
 <p:sld xmlns:a="http://schemas.openxmlformats.org/drawingml/2006/main" xmlns:r="http://schemas.openxmlformats.org/officeDocument/2006/relationships" xmlns:p="http://schemas.openxmlformats.org/presentationml/2006/main">
   <p:cSld>
     <p:spTree>
@@ -14862,10 +15236,173 @@
       </p:grpSpPr>
       <p:sp>
         <p:nvSpPr>
-          <p:cNvPr id="2" name="Text Placeholder 1">
+          <p:cNvPr id="2" name="Title 1">
             <a:extLst>
               <a:ext uri="{FF2B5EF4-FFF2-40B4-BE49-F238E27FC236}">
-                <a16:creationId xmlns:a16="http://schemas.microsoft.com/office/drawing/2014/main" id="{988FCCF2-E44D-35FD-0F32-28703AAD65CD}"/>
+                <a16:creationId xmlns:a16="http://schemas.microsoft.com/office/drawing/2014/main" id="{E5F9F698-5694-CEFE-33F6-F1C01E99B85A}"/>
+              </a:ext>
+            </a:extLst>
+          </p:cNvPr>
+          <p:cNvSpPr>
+            <a:spLocks noGrp="1"/>
+          </p:cNvSpPr>
+          <p:nvPr>
+            <p:ph type="title"/>
+          </p:nvPr>
+        </p:nvSpPr>
+        <p:spPr/>
+        <p:txBody>
+          <a:bodyPr>
+            <a:noAutofit/>
+          </a:bodyPr>
+          <a:lstStyle/>
+          <a:p>
+            <a:r>
+              <a:rPr lang="en-US" sz="3000" b="1" dirty="0"/>
+              <a:t>Data Cleanup &amp; Exploration</a:t>
+            </a:r>
+            <a:endParaRPr lang="en-IN" sz="3000" b="1" dirty="0"/>
+          </a:p>
+        </p:txBody>
+      </p:sp>
+      <p:sp>
+        <p:nvSpPr>
+          <p:cNvPr id="3" name="Text Placeholder 2">
+            <a:extLst>
+              <a:ext uri="{FF2B5EF4-FFF2-40B4-BE49-F238E27FC236}">
+                <a16:creationId xmlns:a16="http://schemas.microsoft.com/office/drawing/2014/main" id="{18995D69-8549-F544-D015-CCB79D76A1ED}"/>
+              </a:ext>
+            </a:extLst>
+          </p:cNvPr>
+          <p:cNvSpPr>
+            <a:spLocks noGrp="1"/>
+          </p:cNvSpPr>
+          <p:nvPr>
+            <p:ph type="body" idx="1"/>
+          </p:nvPr>
+        </p:nvSpPr>
+        <p:spPr>
+          <a:xfrm>
+            <a:off x="247904" y="1131210"/>
+            <a:ext cx="8520600" cy="3416400"/>
+          </a:xfrm>
+        </p:spPr>
+        <p:txBody>
+          <a:bodyPr/>
+          <a:lstStyle/>
+          <a:p>
+            <a:r>
+              <a:rPr lang="en-US" sz="1600" dirty="0"/>
+              <a:t>Our Data frame did not have any Null values.</a:t>
+            </a:r>
+          </a:p>
+          <a:p>
+            <a:r>
+              <a:rPr lang="en-US" sz="1600" dirty="0"/>
+              <a:t>No data type conversion was needed.</a:t>
+            </a:r>
+          </a:p>
+          <a:p>
+            <a:endParaRPr lang="en-IN" dirty="0"/>
+          </a:p>
+        </p:txBody>
+      </p:sp>
+      <p:pic>
+        <p:nvPicPr>
+          <p:cNvPr id="4" name="Picture 3" descr="Table&#10;&#10;Description automatically generated">
+            <a:extLst>
+              <a:ext uri="{FF2B5EF4-FFF2-40B4-BE49-F238E27FC236}">
+                <a16:creationId xmlns:a16="http://schemas.microsoft.com/office/drawing/2014/main" id="{6DD9592C-A3CC-7318-6CCE-3FD2B6296BE9}"/>
+              </a:ext>
+            </a:extLst>
+          </p:cNvPr>
+          <p:cNvPicPr>
+            <a:picLocks noChangeAspect="1"/>
+          </p:cNvPicPr>
+          <p:nvPr/>
+        </p:nvPicPr>
+        <p:blipFill>
+          <a:blip r:embed="rId2"/>
+          <a:stretch>
+            <a:fillRect/>
+          </a:stretch>
+        </p:blipFill>
+        <p:spPr>
+          <a:xfrm>
+            <a:off x="489098" y="2027274"/>
+            <a:ext cx="8028115" cy="2353340"/>
+          </a:xfrm>
+          <a:prstGeom prst="rect">
+            <a:avLst/>
+          </a:prstGeom>
+        </p:spPr>
+      </p:pic>
+    </p:spTree>
+    <p:extLst>
+      <p:ext uri="{BB962C8B-B14F-4D97-AF65-F5344CB8AC3E}">
+        <p14:creationId xmlns:p14="http://schemas.microsoft.com/office/powerpoint/2010/main" val="2181978714"/>
+      </p:ext>
+    </p:extLst>
+  </p:cSld>
+  <p:clrMapOvr>
+    <a:masterClrMapping/>
+  </p:clrMapOvr>
+</p:sld>
+</file>
+
+<file path=ppt/slides/slide7.xml><?xml version="1.0" encoding="utf-8"?>
+<p:sld xmlns:a="http://schemas.openxmlformats.org/drawingml/2006/main" xmlns:r="http://schemas.openxmlformats.org/officeDocument/2006/relationships" xmlns:p="http://schemas.openxmlformats.org/presentationml/2006/main">
+  <p:cSld>
+    <p:spTree>
+      <p:nvGrpSpPr>
+        <p:cNvPr id="1" name=""/>
+        <p:cNvGrpSpPr/>
+        <p:nvPr/>
+      </p:nvGrpSpPr>
+      <p:grpSpPr>
+        <a:xfrm>
+          <a:off x="0" y="0"/>
+          <a:ext cx="0" cy="0"/>
+          <a:chOff x="0" y="0"/>
+          <a:chExt cx="0" cy="0"/>
+        </a:xfrm>
+      </p:grpSpPr>
+      <p:sp>
+        <p:nvSpPr>
+          <p:cNvPr id="2" name="Title 1">
+            <a:extLst>
+              <a:ext uri="{FF2B5EF4-FFF2-40B4-BE49-F238E27FC236}">
+                <a16:creationId xmlns:a16="http://schemas.microsoft.com/office/drawing/2014/main" id="{580E585C-D509-4339-5FD4-435A47BFA4C0}"/>
+              </a:ext>
+            </a:extLst>
+          </p:cNvPr>
+          <p:cNvSpPr>
+            <a:spLocks noGrp="1"/>
+          </p:cNvSpPr>
+          <p:nvPr>
+            <p:ph type="title"/>
+          </p:nvPr>
+        </p:nvSpPr>
+        <p:spPr/>
+        <p:txBody>
+          <a:bodyPr>
+            <a:normAutofit fontScale="90000"/>
+          </a:bodyPr>
+          <a:lstStyle/>
+          <a:p>
+            <a:r>
+              <a:rPr lang="en-IN" b="1" dirty="0"/>
+              <a:t>Summary</a:t>
+            </a:r>
+          </a:p>
+        </p:txBody>
+      </p:sp>
+      <p:sp>
+        <p:nvSpPr>
+          <p:cNvPr id="3" name="Text Placeholder 2">
+            <a:extLst>
+              <a:ext uri="{FF2B5EF4-FFF2-40B4-BE49-F238E27FC236}">
+                <a16:creationId xmlns:a16="http://schemas.microsoft.com/office/drawing/2014/main" id="{D9BE4FE2-A70F-9C24-0FAB-A0014CF2D6ED}"/>
               </a:ext>
             </a:extLst>
           </p:cNvPr>
@@ -14881,45 +15418,14 @@
           <a:bodyPr/>
           <a:lstStyle/>
           <a:p>
-            <a:r>
-              <a:rPr lang="en-US" dirty="0"/>
-              <a:t>POOJA START HERE</a:t>
-            </a:r>
-          </a:p>
-        </p:txBody>
-      </p:sp>
-      <p:sp>
-        <p:nvSpPr>
-          <p:cNvPr id="3" name="Title 2">
-            <a:extLst>
-              <a:ext uri="{FF2B5EF4-FFF2-40B4-BE49-F238E27FC236}">
-                <a16:creationId xmlns:a16="http://schemas.microsoft.com/office/drawing/2014/main" id="{6FEEE0E3-AAA4-491D-06D0-35680B3C7906}"/>
-              </a:ext>
-            </a:extLst>
-          </p:cNvPr>
-          <p:cNvSpPr>
-            <a:spLocks noGrp="1"/>
-          </p:cNvSpPr>
-          <p:nvPr>
-            <p:ph type="title"/>
-          </p:nvPr>
-        </p:nvSpPr>
-        <p:spPr/>
-        <p:txBody>
-          <a:bodyPr/>
-          <a:lstStyle/>
-          <a:p>
-            <a:r>
-              <a:rPr lang="en-US" dirty="0"/>
-              <a:t>DELETE LATER</a:t>
-            </a:r>
+            <a:endParaRPr lang="en-IN" dirty="0"/>
           </a:p>
         </p:txBody>
       </p:sp>
     </p:spTree>
     <p:extLst>
       <p:ext uri="{BB962C8B-B14F-4D97-AF65-F5344CB8AC3E}">
-        <p14:creationId xmlns:p14="http://schemas.microsoft.com/office/powerpoint/2010/main" val="2766247055"/>
+        <p14:creationId xmlns:p14="http://schemas.microsoft.com/office/powerpoint/2010/main" val="2668814420"/>
       </p:ext>
     </p:extLst>
   </p:cSld>
@@ -14929,7 +15435,7 @@
 </p:sld>
 </file>
 
-<file path=ppt/slides/slide5.xml><?xml version="1.0" encoding="utf-8"?>
+<file path=ppt/slides/slide8.xml><?xml version="1.0" encoding="utf-8"?>
 <p:sld xmlns:a="http://schemas.openxmlformats.org/drawingml/2006/main" xmlns:r="http://schemas.openxmlformats.org/officeDocument/2006/relationships" xmlns:p="http://schemas.openxmlformats.org/presentationml/2006/main">
   <p:cSld>
     <p:spTree>
@@ -14995,138 +15501,6 @@
             <a:r>
               <a:rPr lang="en"/>
               <a:t>EXPLORATORY DATA ANALYSIS</a:t>
-            </a:r>
-            <a:endParaRPr/>
-          </a:p>
-        </p:txBody>
-      </p:sp>
-    </p:spTree>
-  </p:cSld>
-  <p:clrMapOvr>
-    <a:masterClrMapping/>
-  </p:clrMapOvr>
-</p:sld>
-</file>
-
-<file path=ppt/slides/slide6.xml><?xml version="1.0" encoding="utf-8"?>
-<p:sld xmlns:a="http://schemas.openxmlformats.org/drawingml/2006/main" xmlns:r="http://schemas.openxmlformats.org/officeDocument/2006/relationships" xmlns:p="http://schemas.openxmlformats.org/presentationml/2006/main">
-  <p:cSld>
-    <p:spTree>
-      <p:nvGrpSpPr>
-        <p:cNvPr id="1" name="Shape 146"/>
-        <p:cNvGrpSpPr/>
-        <p:nvPr/>
-      </p:nvGrpSpPr>
-      <p:grpSpPr>
-        <a:xfrm>
-          <a:off x="0" y="0"/>
-          <a:ext cx="0" cy="0"/>
-          <a:chOff x="0" y="0"/>
-          <a:chExt cx="0" cy="0"/>
-        </a:xfrm>
-      </p:grpSpPr>
-      <p:sp>
-        <p:nvSpPr>
-          <p:cNvPr id="147" name="Google Shape;147;p30"/>
-          <p:cNvSpPr txBox="1">
-            <a:spLocks noGrp="1"/>
-          </p:cNvSpPr>
-          <p:nvPr>
-            <p:ph type="title"/>
-          </p:nvPr>
-        </p:nvSpPr>
-        <p:spPr>
-          <a:xfrm>
-            <a:off x="320040" y="98994"/>
-            <a:ext cx="7874597" cy="790687"/>
-          </a:xfrm>
-          <a:prstGeom prst="rect">
-            <a:avLst/>
-          </a:prstGeom>
-          <a:noFill/>
-          <a:ln>
-            <a:noFill/>
-          </a:ln>
-        </p:spPr>
-        <p:txBody>
-          <a:bodyPr spcFirstLastPara="1" wrap="square" lIns="68575" tIns="34275" rIns="68575" bIns="34275" anchor="ctr" anchorCtr="0">
-            <a:normAutofit/>
-          </a:bodyPr>
-          <a:lstStyle/>
-          <a:p>
-            <a:pPr marL="0" lvl="0" indent="0" algn="l" rtl="0">
-              <a:lnSpc>
-                <a:spcPct val="90000"/>
-              </a:lnSpc>
-              <a:spcBef>
-                <a:spcPts val="0"/>
-              </a:spcBef>
-              <a:spcAft>
-                <a:spcPts val="0"/>
-              </a:spcAft>
-              <a:buClr>
-                <a:srgbClr val="3F3F3F"/>
-              </a:buClr>
-              <a:buSzPts val="3000"/>
-              <a:buFont typeface="Arial"/>
-              <a:buNone/>
-            </a:pPr>
-            <a:r>
-              <a:rPr lang="en"/>
-              <a:t>Data Description</a:t>
-            </a:r>
-            <a:endParaRPr/>
-          </a:p>
-        </p:txBody>
-      </p:sp>
-      <p:sp>
-        <p:nvSpPr>
-          <p:cNvPr id="148" name="Google Shape;148;p30"/>
-          <p:cNvSpPr txBox="1">
-            <a:spLocks noGrp="1"/>
-          </p:cNvSpPr>
-          <p:nvPr>
-            <p:ph type="body" idx="1"/>
-          </p:nvPr>
-        </p:nvSpPr>
-        <p:spPr>
-          <a:xfrm>
-            <a:off x="628650" y="1369219"/>
-            <a:ext cx="7886700" cy="2605881"/>
-          </a:xfrm>
-          <a:prstGeom prst="rect">
-            <a:avLst/>
-          </a:prstGeom>
-          <a:noFill/>
-          <a:ln>
-            <a:noFill/>
-          </a:ln>
-        </p:spPr>
-        <p:txBody>
-          <a:bodyPr spcFirstLastPara="1" wrap="square" lIns="68575" tIns="34275" rIns="68575" bIns="34275" anchor="t" anchorCtr="0">
-            <a:normAutofit/>
-          </a:bodyPr>
-          <a:lstStyle/>
-          <a:p>
-            <a:pPr marL="0" lvl="0" indent="0" algn="l" rtl="0">
-              <a:lnSpc>
-                <a:spcPct val="90000"/>
-              </a:lnSpc>
-              <a:spcBef>
-                <a:spcPts val="0"/>
-              </a:spcBef>
-              <a:spcAft>
-                <a:spcPts val="0"/>
-              </a:spcAft>
-              <a:buClr>
-                <a:srgbClr val="595959"/>
-              </a:buClr>
-              <a:buSzPts val="2100"/>
-              <a:buNone/>
-            </a:pPr>
-            <a:r>
-              <a:rPr lang="en"/>
-              <a:t>The</a:t>
             </a:r>
             <a:endParaRPr/>
           </a:p>

</xml_diff>